<commit_message>
correciones de la presentación y apuntes para presentar
</commit_message>
<xml_diff>
--- a/IOT/trabajo/presentacion.pptx
+++ b/IOT/trabajo/presentacion.pptx
@@ -19440,8 +19440,30 @@
         </p:blipFill>
         <p:spPr bwMode="auto">
           <a:xfrm flipH="0" flipV="0">
-            <a:off x="730499" y="1937108"/>
-            <a:ext cx="4143562" cy="2762271"/>
+            <a:off x="730498" y="2547383"/>
+            <a:ext cx="4143561" cy="2151995"/>
+          </a:xfrm>
+          <a:prstGeom prst="rect">
+            <a:avLst/>
+          </a:prstGeom>
+        </p:spPr>
+      </p:pic>
+      <p:pic>
+        <p:nvPicPr>
+          <p:cNvPr id="448749784" name=""/>
+          <p:cNvPicPr>
+            <a:picLocks noChangeAspect="1"/>
+          </p:cNvPicPr>
+          <p:nvPr/>
+        </p:nvPicPr>
+        <p:blipFill>
+          <a:blip r:embed="rId4"/>
+          <a:stretch/>
+        </p:blipFill>
+        <p:spPr bwMode="auto">
+          <a:xfrm flipH="0" flipV="0">
+            <a:off x="1218746" y="1927150"/>
+            <a:ext cx="3156540" cy="520552"/>
           </a:xfrm>
           <a:prstGeom prst="rect">
             <a:avLst/>
@@ -26432,6 +26454,10 @@
             <a:r>
               <a:rPr sz="2800" b="1"/>
               <a:t>PSK</a:t>
+            </a:r>
+            <a:r>
+              <a:rPr sz="2800" b="1"/>
+              <a:t> y órdenes mayores</a:t>
             </a:r>
             <a:endParaRPr b="1"/>
           </a:p>

</xml_diff>

<commit_message>
Correciones en la presentacion.
</commit_message>
<xml_diff>
--- a/IOT/trabajo/presentacion.pptx
+++ b/IOT/trabajo/presentacion.pptx
@@ -20970,7 +20970,15 @@
             </a:pPr>
             <a:r>
               <a:rPr/>
-              <a:t>Seguimiento archivos y lectura contadoras - pi/2 BPSK, QPSK</a:t>
+              <a:t>Seguimiento </a:t>
+            </a:r>
+            <a:r>
+              <a:rPr/>
+              <a:t>activos </a:t>
+            </a:r>
+            <a:r>
+              <a:rPr/>
+              <a:t>y lectura contadoras - pi/2 BPSK, QPSK</a:t>
             </a:r>
             <a:endParaRPr/>
           </a:p>
@@ -21299,286 +21307,6 @@
       </p:sp>
       <p:sp>
         <p:nvSpPr>
-          <p:cNvPr id="1108541324" name="Google Shape;166;p30"/>
-          <p:cNvSpPr txBox="1"/>
-          <p:nvPr/>
-        </p:nvSpPr>
-        <p:spPr bwMode="auto">
-          <a:xfrm>
-            <a:off x="4283100" y="3544012"/>
-            <a:ext cx="577800" cy="677099"/>
-          </a:xfrm>
-          <a:prstGeom prst="rect">
-            <a:avLst/>
-          </a:prstGeom>
-        </p:spPr>
-        <p:txBody>
-          <a:bodyPr spcFirstLastPara="1" wrap="square" lIns="91423" tIns="91423" rIns="91423" bIns="91423" anchor="t" anchorCtr="0">
-            <a:noAutofit/>
-          </a:bodyPr>
-          <a:lstStyle>
-            <a:defPPr marR="0" lvl="0" algn="l">
-              <a:lnSpc>
-                <a:spcPct val="100000"/>
-              </a:lnSpc>
-              <a:spcBef>
-                <a:spcPts val="0"/>
-              </a:spcBef>
-              <a:spcAft>
-                <a:spcPts val="0"/>
-              </a:spcAft>
-            </a:defPPr>
-            <a:lvl1pPr marR="0" lvl="0" algn="l">
-              <a:lnSpc>
-                <a:spcPct val="100000"/>
-              </a:lnSpc>
-              <a:spcBef>
-                <a:spcPts val="0"/>
-              </a:spcBef>
-              <a:spcAft>
-                <a:spcPts val="0"/>
-              </a:spcAft>
-              <a:buClr>
-                <a:schemeClr val="dk1"/>
-              </a:buClr>
-              <a:buSzPts val="2600"/>
-              <a:buFont typeface="Inter Medium"/>
-              <a:buNone/>
-              <a:defRPr sz="2600" b="0" i="0" u="none" strike="noStrike" cap="none">
-                <a:solidFill>
-                  <a:schemeClr val="dk1"/>
-                </a:solidFill>
-                <a:latin typeface="Inter Medium"/>
-                <a:ea typeface="Inter Medium"/>
-                <a:cs typeface="Inter Medium"/>
-              </a:defRPr>
-            </a:lvl1pPr>
-            <a:lvl2pPr marR="0" lvl="1" algn="l">
-              <a:lnSpc>
-                <a:spcPct val="100000"/>
-              </a:lnSpc>
-              <a:spcBef>
-                <a:spcPts val="0"/>
-              </a:spcBef>
-              <a:spcAft>
-                <a:spcPts val="0"/>
-              </a:spcAft>
-              <a:buClr>
-                <a:schemeClr val="dk1"/>
-              </a:buClr>
-              <a:buSzPts val="2600"/>
-              <a:buFont typeface="Inter Medium"/>
-              <a:buNone/>
-              <a:defRPr sz="2600" b="0" i="0" u="none" strike="noStrike" cap="none">
-                <a:solidFill>
-                  <a:schemeClr val="dk1"/>
-                </a:solidFill>
-                <a:latin typeface="Inter Medium"/>
-                <a:ea typeface="Inter Medium"/>
-                <a:cs typeface="Inter Medium"/>
-              </a:defRPr>
-            </a:lvl2pPr>
-            <a:lvl3pPr marR="0" lvl="2" algn="l">
-              <a:lnSpc>
-                <a:spcPct val="100000"/>
-              </a:lnSpc>
-              <a:spcBef>
-                <a:spcPts val="0"/>
-              </a:spcBef>
-              <a:spcAft>
-                <a:spcPts val="0"/>
-              </a:spcAft>
-              <a:buClr>
-                <a:schemeClr val="dk1"/>
-              </a:buClr>
-              <a:buSzPts val="2600"/>
-              <a:buFont typeface="Inter Medium"/>
-              <a:buNone/>
-              <a:defRPr sz="2600" b="0" i="0" u="none" strike="noStrike" cap="none">
-                <a:solidFill>
-                  <a:schemeClr val="dk1"/>
-                </a:solidFill>
-                <a:latin typeface="Inter Medium"/>
-                <a:ea typeface="Inter Medium"/>
-                <a:cs typeface="Inter Medium"/>
-              </a:defRPr>
-            </a:lvl3pPr>
-            <a:lvl4pPr marR="0" lvl="3" algn="l">
-              <a:lnSpc>
-                <a:spcPct val="100000"/>
-              </a:lnSpc>
-              <a:spcBef>
-                <a:spcPts val="0"/>
-              </a:spcBef>
-              <a:spcAft>
-                <a:spcPts val="0"/>
-              </a:spcAft>
-              <a:buClr>
-                <a:schemeClr val="dk1"/>
-              </a:buClr>
-              <a:buSzPts val="2600"/>
-              <a:buFont typeface="Inter Medium"/>
-              <a:buNone/>
-              <a:defRPr sz="2600" b="0" i="0" u="none" strike="noStrike" cap="none">
-                <a:solidFill>
-                  <a:schemeClr val="dk1"/>
-                </a:solidFill>
-                <a:latin typeface="Inter Medium"/>
-                <a:ea typeface="Inter Medium"/>
-                <a:cs typeface="Inter Medium"/>
-              </a:defRPr>
-            </a:lvl4pPr>
-            <a:lvl5pPr marR="0" lvl="4" algn="l">
-              <a:lnSpc>
-                <a:spcPct val="100000"/>
-              </a:lnSpc>
-              <a:spcBef>
-                <a:spcPts val="0"/>
-              </a:spcBef>
-              <a:spcAft>
-                <a:spcPts val="0"/>
-              </a:spcAft>
-              <a:buClr>
-                <a:schemeClr val="dk1"/>
-              </a:buClr>
-              <a:buSzPts val="2600"/>
-              <a:buFont typeface="Inter Medium"/>
-              <a:buNone/>
-              <a:defRPr sz="2600" b="0" i="0" u="none" strike="noStrike" cap="none">
-                <a:solidFill>
-                  <a:schemeClr val="dk1"/>
-                </a:solidFill>
-                <a:latin typeface="Inter Medium"/>
-                <a:ea typeface="Inter Medium"/>
-                <a:cs typeface="Inter Medium"/>
-              </a:defRPr>
-            </a:lvl5pPr>
-            <a:lvl6pPr marR="0" lvl="5" algn="l">
-              <a:lnSpc>
-                <a:spcPct val="100000"/>
-              </a:lnSpc>
-              <a:spcBef>
-                <a:spcPts val="0"/>
-              </a:spcBef>
-              <a:spcAft>
-                <a:spcPts val="0"/>
-              </a:spcAft>
-              <a:buClr>
-                <a:schemeClr val="dk1"/>
-              </a:buClr>
-              <a:buSzPts val="2600"/>
-              <a:buFont typeface="Inter Medium"/>
-              <a:buNone/>
-              <a:defRPr sz="2600" b="0" i="0" u="none" strike="noStrike" cap="none">
-                <a:solidFill>
-                  <a:schemeClr val="dk1"/>
-                </a:solidFill>
-                <a:latin typeface="Inter Medium"/>
-                <a:ea typeface="Inter Medium"/>
-                <a:cs typeface="Inter Medium"/>
-              </a:defRPr>
-            </a:lvl6pPr>
-            <a:lvl7pPr marR="0" lvl="6" algn="l">
-              <a:lnSpc>
-                <a:spcPct val="100000"/>
-              </a:lnSpc>
-              <a:spcBef>
-                <a:spcPts val="0"/>
-              </a:spcBef>
-              <a:spcAft>
-                <a:spcPts val="0"/>
-              </a:spcAft>
-              <a:buClr>
-                <a:schemeClr val="dk1"/>
-              </a:buClr>
-              <a:buSzPts val="2600"/>
-              <a:buFont typeface="Inter Medium"/>
-              <a:buNone/>
-              <a:defRPr sz="2600" b="0" i="0" u="none" strike="noStrike" cap="none">
-                <a:solidFill>
-                  <a:schemeClr val="dk1"/>
-                </a:solidFill>
-                <a:latin typeface="Inter Medium"/>
-                <a:ea typeface="Inter Medium"/>
-                <a:cs typeface="Inter Medium"/>
-              </a:defRPr>
-            </a:lvl7pPr>
-            <a:lvl8pPr marR="0" lvl="7" algn="l">
-              <a:lnSpc>
-                <a:spcPct val="100000"/>
-              </a:lnSpc>
-              <a:spcBef>
-                <a:spcPts val="0"/>
-              </a:spcBef>
-              <a:spcAft>
-                <a:spcPts val="0"/>
-              </a:spcAft>
-              <a:buClr>
-                <a:schemeClr val="dk1"/>
-              </a:buClr>
-              <a:buSzPts val="2600"/>
-              <a:buFont typeface="Inter Medium"/>
-              <a:buNone/>
-              <a:defRPr sz="2600" b="0" i="0" u="none" strike="noStrike" cap="none">
-                <a:solidFill>
-                  <a:schemeClr val="dk1"/>
-                </a:solidFill>
-                <a:latin typeface="Inter Medium"/>
-                <a:ea typeface="Inter Medium"/>
-                <a:cs typeface="Inter Medium"/>
-              </a:defRPr>
-            </a:lvl8pPr>
-            <a:lvl9pPr marR="0" lvl="8" algn="l">
-              <a:lnSpc>
-                <a:spcPct val="100000"/>
-              </a:lnSpc>
-              <a:spcBef>
-                <a:spcPts val="0"/>
-              </a:spcBef>
-              <a:spcAft>
-                <a:spcPts val="0"/>
-              </a:spcAft>
-              <a:buClr>
-                <a:schemeClr val="dk1"/>
-              </a:buClr>
-              <a:buSzPts val="2600"/>
-              <a:buFont typeface="Inter Medium"/>
-              <a:buNone/>
-              <a:defRPr sz="2600" b="0" i="0" u="none" strike="noStrike" cap="none">
-                <a:solidFill>
-                  <a:schemeClr val="dk1"/>
-                </a:solidFill>
-                <a:latin typeface="Inter Medium"/>
-                <a:ea typeface="Inter Medium"/>
-                <a:cs typeface="Inter Medium"/>
-              </a:defRPr>
-            </a:lvl9pPr>
-          </a:lstStyle>
-          <a:p>
-            <a:pPr marL="0" lvl="0" indent="0" algn="ctr">
-              <a:spcBef>
-                <a:spcPts val="0"/>
-              </a:spcBef>
-              <a:spcAft>
-                <a:spcPts val="0"/>
-              </a:spcAft>
-              <a:buNone/>
-              <a:defRPr/>
-            </a:pPr>
-            <a:r>
-              <a:rPr/>
-              <a:t>6</a:t>
-            </a:r>
-            <a:r>
-              <a:rPr lang="en"/>
-              <a:t>.</a:t>
-            </a:r>
-            <a:endParaRPr/>
-          </a:p>
-        </p:txBody>
-      </p:sp>
-      <p:sp>
-        <p:nvSpPr>
           <p:cNvPr id="1535708683" name="Google Shape;169;p30"/>
           <p:cNvSpPr txBox="1"/>
           <p:nvPr/>
@@ -21848,282 +21576,6 @@
             <a:r>
               <a:rPr/>
               <a:t>Hogar Inteligente y termostatos - FSK</a:t>
-            </a:r>
-            <a:endParaRPr/>
-          </a:p>
-        </p:txBody>
-      </p:sp>
-      <p:sp>
-        <p:nvSpPr>
-          <p:cNvPr id="995512332" name="Google Shape;170;p30"/>
-          <p:cNvSpPr txBox="1"/>
-          <p:nvPr/>
-        </p:nvSpPr>
-        <p:spPr bwMode="auto">
-          <a:xfrm flipH="0" flipV="0">
-            <a:off x="4862363" y="3543999"/>
-            <a:ext cx="2702098" cy="908382"/>
-          </a:xfrm>
-          <a:prstGeom prst="rect">
-            <a:avLst/>
-          </a:prstGeom>
-        </p:spPr>
-        <p:txBody>
-          <a:bodyPr spcFirstLastPara="1" wrap="square" lIns="91423" tIns="91423" rIns="91423" bIns="91423" anchor="t" anchorCtr="0">
-            <a:noAutofit/>
-          </a:bodyPr>
-          <a:lstStyle>
-            <a:defPPr marR="0" lvl="0" algn="l">
-              <a:lnSpc>
-                <a:spcPct val="100000"/>
-              </a:lnSpc>
-              <a:spcBef>
-                <a:spcPts val="0"/>
-              </a:spcBef>
-              <a:spcAft>
-                <a:spcPts val="0"/>
-              </a:spcAft>
-            </a:defPPr>
-            <a:lvl1pPr marL="457200" marR="0" lvl="0" indent="-304799" algn="l">
-              <a:lnSpc>
-                <a:spcPct val="100000"/>
-              </a:lnSpc>
-              <a:spcBef>
-                <a:spcPts val="0"/>
-              </a:spcBef>
-              <a:spcAft>
-                <a:spcPts val="0"/>
-              </a:spcAft>
-              <a:buClr>
-                <a:schemeClr val="dk1"/>
-              </a:buClr>
-              <a:buSzPts val="2400"/>
-              <a:buFont typeface="Inter"/>
-              <a:buNone/>
-              <a:defRPr sz="1600" b="0" i="0" u="none" strike="noStrike" cap="none">
-                <a:solidFill>
-                  <a:schemeClr val="dk1"/>
-                </a:solidFill>
-                <a:latin typeface="Inter Medium"/>
-                <a:ea typeface="Inter Medium"/>
-                <a:cs typeface="Inter Medium"/>
-              </a:defRPr>
-            </a:lvl1pPr>
-            <a:lvl2pPr marL="914400" marR="0" lvl="1" indent="-304799" algn="l">
-              <a:lnSpc>
-                <a:spcPct val="100000"/>
-              </a:lnSpc>
-              <a:spcBef>
-                <a:spcPts val="0"/>
-              </a:spcBef>
-              <a:spcAft>
-                <a:spcPts val="0"/>
-              </a:spcAft>
-              <a:buClr>
-                <a:schemeClr val="dk1"/>
-              </a:buClr>
-              <a:buSzPts val="2400"/>
-              <a:buFont typeface="Inter"/>
-              <a:buNone/>
-              <a:defRPr sz="2400" b="1" i="0" u="none" strike="noStrike" cap="none">
-                <a:solidFill>
-                  <a:schemeClr val="dk1"/>
-                </a:solidFill>
-                <a:latin typeface="Inter"/>
-                <a:ea typeface="Inter"/>
-                <a:cs typeface="Inter"/>
-              </a:defRPr>
-            </a:lvl2pPr>
-            <a:lvl3pPr marL="1371600" marR="0" lvl="2" indent="-304799" algn="l">
-              <a:lnSpc>
-                <a:spcPct val="100000"/>
-              </a:lnSpc>
-              <a:spcBef>
-                <a:spcPts val="0"/>
-              </a:spcBef>
-              <a:spcAft>
-                <a:spcPts val="0"/>
-              </a:spcAft>
-              <a:buClr>
-                <a:schemeClr val="dk1"/>
-              </a:buClr>
-              <a:buSzPts val="2400"/>
-              <a:buFont typeface="Inter"/>
-              <a:buNone/>
-              <a:defRPr sz="2400" b="1" i="0" u="none" strike="noStrike" cap="none">
-                <a:solidFill>
-                  <a:schemeClr val="dk1"/>
-                </a:solidFill>
-                <a:latin typeface="Inter"/>
-                <a:ea typeface="Inter"/>
-                <a:cs typeface="Inter"/>
-              </a:defRPr>
-            </a:lvl3pPr>
-            <a:lvl4pPr marL="1828800" marR="0" lvl="3" indent="-304799" algn="l">
-              <a:lnSpc>
-                <a:spcPct val="100000"/>
-              </a:lnSpc>
-              <a:spcBef>
-                <a:spcPts val="0"/>
-              </a:spcBef>
-              <a:spcAft>
-                <a:spcPts val="0"/>
-              </a:spcAft>
-              <a:buClr>
-                <a:schemeClr val="dk1"/>
-              </a:buClr>
-              <a:buSzPts val="2400"/>
-              <a:buFont typeface="Inter"/>
-              <a:buNone/>
-              <a:defRPr sz="2400" b="1" i="0" u="none" strike="noStrike" cap="none">
-                <a:solidFill>
-                  <a:schemeClr val="dk1"/>
-                </a:solidFill>
-                <a:latin typeface="Inter"/>
-                <a:ea typeface="Inter"/>
-                <a:cs typeface="Inter"/>
-              </a:defRPr>
-            </a:lvl4pPr>
-            <a:lvl5pPr marL="2286000" marR="0" lvl="4" indent="-304799" algn="l">
-              <a:lnSpc>
-                <a:spcPct val="100000"/>
-              </a:lnSpc>
-              <a:spcBef>
-                <a:spcPts val="0"/>
-              </a:spcBef>
-              <a:spcAft>
-                <a:spcPts val="0"/>
-              </a:spcAft>
-              <a:buClr>
-                <a:schemeClr val="dk1"/>
-              </a:buClr>
-              <a:buSzPts val="2400"/>
-              <a:buFont typeface="Inter"/>
-              <a:buNone/>
-              <a:defRPr sz="2400" b="1" i="0" u="none" strike="noStrike" cap="none">
-                <a:solidFill>
-                  <a:schemeClr val="dk1"/>
-                </a:solidFill>
-                <a:latin typeface="Inter"/>
-                <a:ea typeface="Inter"/>
-                <a:cs typeface="Inter"/>
-              </a:defRPr>
-            </a:lvl5pPr>
-            <a:lvl6pPr marL="2743200" marR="0" lvl="5" indent="-304799" algn="l">
-              <a:lnSpc>
-                <a:spcPct val="100000"/>
-              </a:lnSpc>
-              <a:spcBef>
-                <a:spcPts val="0"/>
-              </a:spcBef>
-              <a:spcAft>
-                <a:spcPts val="0"/>
-              </a:spcAft>
-              <a:buClr>
-                <a:schemeClr val="dk1"/>
-              </a:buClr>
-              <a:buSzPts val="2400"/>
-              <a:buFont typeface="Inter"/>
-              <a:buNone/>
-              <a:defRPr sz="2400" b="1" i="0" u="none" strike="noStrike" cap="none">
-                <a:solidFill>
-                  <a:schemeClr val="dk1"/>
-                </a:solidFill>
-                <a:latin typeface="Inter"/>
-                <a:ea typeface="Inter"/>
-                <a:cs typeface="Inter"/>
-              </a:defRPr>
-            </a:lvl6pPr>
-            <a:lvl7pPr marL="3200400" marR="0" lvl="6" indent="-304799" algn="l">
-              <a:lnSpc>
-                <a:spcPct val="100000"/>
-              </a:lnSpc>
-              <a:spcBef>
-                <a:spcPts val="0"/>
-              </a:spcBef>
-              <a:spcAft>
-                <a:spcPts val="0"/>
-              </a:spcAft>
-              <a:buClr>
-                <a:schemeClr val="dk1"/>
-              </a:buClr>
-              <a:buSzPts val="2400"/>
-              <a:buFont typeface="Inter"/>
-              <a:buNone/>
-              <a:defRPr sz="2400" b="1" i="0" u="none" strike="noStrike" cap="none">
-                <a:solidFill>
-                  <a:schemeClr val="dk1"/>
-                </a:solidFill>
-                <a:latin typeface="Inter"/>
-                <a:ea typeface="Inter"/>
-                <a:cs typeface="Inter"/>
-              </a:defRPr>
-            </a:lvl7pPr>
-            <a:lvl8pPr marL="3657600" marR="0" lvl="7" indent="-304799" algn="l">
-              <a:lnSpc>
-                <a:spcPct val="100000"/>
-              </a:lnSpc>
-              <a:spcBef>
-                <a:spcPts val="0"/>
-              </a:spcBef>
-              <a:spcAft>
-                <a:spcPts val="0"/>
-              </a:spcAft>
-              <a:buClr>
-                <a:schemeClr val="dk1"/>
-              </a:buClr>
-              <a:buSzPts val="2400"/>
-              <a:buFont typeface="Inter"/>
-              <a:buNone/>
-              <a:defRPr sz="2400" b="1" i="0" u="none" strike="noStrike" cap="none">
-                <a:solidFill>
-                  <a:schemeClr val="dk1"/>
-                </a:solidFill>
-                <a:latin typeface="Inter"/>
-                <a:ea typeface="Inter"/>
-                <a:cs typeface="Inter"/>
-              </a:defRPr>
-            </a:lvl8pPr>
-            <a:lvl9pPr marL="4114800" marR="0" lvl="8" indent="-304799" algn="l">
-              <a:lnSpc>
-                <a:spcPct val="100000"/>
-              </a:lnSpc>
-              <a:spcBef>
-                <a:spcPts val="0"/>
-              </a:spcBef>
-              <a:spcAft>
-                <a:spcPts val="0"/>
-              </a:spcAft>
-              <a:buClr>
-                <a:schemeClr val="dk1"/>
-              </a:buClr>
-              <a:buSzPts val="2400"/>
-              <a:buFont typeface="Inter"/>
-              <a:buNone/>
-              <a:defRPr sz="2400" b="1" i="0" u="none" strike="noStrike" cap="none">
-                <a:solidFill>
-                  <a:schemeClr val="dk1"/>
-                </a:solidFill>
-                <a:latin typeface="Inter"/>
-                <a:ea typeface="Inter"/>
-                <a:cs typeface="Inter"/>
-              </a:defRPr>
-            </a:lvl9pPr>
-          </a:lstStyle>
-          <a:p>
-            <a:pPr marL="0" lvl="0" indent="0" algn="l">
-              <a:spcBef>
-                <a:spcPts val="0"/>
-              </a:spcBef>
-              <a:spcAft>
-                <a:spcPts val="0"/>
-              </a:spcAft>
-              <a:buNone/>
-              <a:defRPr/>
-            </a:pPr>
-            <a:r>
-              <a:rPr/>
-              <a:t>Sistemas buscapersonas - FSK</a:t>
             </a:r>
             <a:endParaRPr/>
           </a:p>

</xml_diff>